<commit_message>
"root square mean error" typo fixed
</commit_message>
<xml_diff>
--- a/statistics/XOR benchmark/Benchmark Results.pptx
+++ b/statistics/XOR benchmark/Benchmark Results.pptx
@@ -3438,7 +3438,7 @@
           <p:nvPr>
             <p:extLst>
               <p:ext uri="{D42A27DB-BD31-4B8C-83A1-F6EECF244321}">
-                <p14:modId xmlns:p14="http://schemas.microsoft.com/office/powerpoint/2010/main" val="1764140942"/>
+                <p14:modId xmlns:p14="http://schemas.microsoft.com/office/powerpoint/2010/main" val="2969496565"/>
               </p:ext>
             </p:extLst>
           </p:nvPr>
@@ -3498,7 +3498,7 @@
                     <a:p>
                       <a:r>
                         <a:rPr lang="en-US" b="1" dirty="0"/>
-                        <a:t>Root Square Mean Error</a:t>
+                        <a:t>Root Mean Square Error</a:t>
                       </a:r>
                       <a:endParaRPr lang="tr-TR" b="1" dirty="0"/>
                     </a:p>
@@ -4445,7 +4445,7 @@
           <p:nvPr>
             <p:extLst>
               <p:ext uri="{D42A27DB-BD31-4B8C-83A1-F6EECF244321}">
-                <p14:modId xmlns:p14="http://schemas.microsoft.com/office/powerpoint/2010/main" val="2898311342"/>
+                <p14:modId xmlns:p14="http://schemas.microsoft.com/office/powerpoint/2010/main" val="3265149810"/>
               </p:ext>
             </p:extLst>
           </p:nvPr>
@@ -4504,8 +4504,12 @@
                     <a:lstStyle/>
                     <a:p>
                       <a:r>
+                        <a:rPr lang="en-US" b="1"/>
+                        <a:t>Root Mean Square </a:t>
+                      </a:r>
+                      <a:r>
                         <a:rPr lang="en-US" b="1" dirty="0"/>
-                        <a:t>Root Square Mean Error</a:t>
+                        <a:t>Error</a:t>
                       </a:r>
                       <a:endParaRPr lang="tr-TR" b="1" dirty="0"/>
                     </a:p>

</xml_diff>

<commit_message>
added some media and fixed the issue that happens takeInputs 1 selected
</commit_message>
<xml_diff>
--- a/statistics/XOR benchmark/Benchmark Results.pptx
+++ b/statistics/XOR benchmark/Benchmark Results.pptx
@@ -261,7 +261,7 @@
           <a:p>
             <a:fld id="{DDE8600B-13D8-445D-818A-D9988767CA6C}" type="datetimeFigureOut">
               <a:rPr lang="tr-TR" smtClean="0"/>
-              <a:t>11.08.2018</a:t>
+              <a:t>12.08.2018</a:t>
             </a:fld>
             <a:endParaRPr lang="tr-TR"/>
           </a:p>
@@ -459,7 +459,7 @@
           <a:p>
             <a:fld id="{DDE8600B-13D8-445D-818A-D9988767CA6C}" type="datetimeFigureOut">
               <a:rPr lang="tr-TR" smtClean="0"/>
-              <a:t>11.08.2018</a:t>
+              <a:t>12.08.2018</a:t>
             </a:fld>
             <a:endParaRPr lang="tr-TR"/>
           </a:p>
@@ -667,7 +667,7 @@
           <a:p>
             <a:fld id="{DDE8600B-13D8-445D-818A-D9988767CA6C}" type="datetimeFigureOut">
               <a:rPr lang="tr-TR" smtClean="0"/>
-              <a:t>11.08.2018</a:t>
+              <a:t>12.08.2018</a:t>
             </a:fld>
             <a:endParaRPr lang="tr-TR"/>
           </a:p>
@@ -865,7 +865,7 @@
           <a:p>
             <a:fld id="{DDE8600B-13D8-445D-818A-D9988767CA6C}" type="datetimeFigureOut">
               <a:rPr lang="tr-TR" smtClean="0"/>
-              <a:t>11.08.2018</a:t>
+              <a:t>12.08.2018</a:t>
             </a:fld>
             <a:endParaRPr lang="tr-TR"/>
           </a:p>
@@ -1140,7 +1140,7 @@
           <a:p>
             <a:fld id="{DDE8600B-13D8-445D-818A-D9988767CA6C}" type="datetimeFigureOut">
               <a:rPr lang="tr-TR" smtClean="0"/>
-              <a:t>11.08.2018</a:t>
+              <a:t>12.08.2018</a:t>
             </a:fld>
             <a:endParaRPr lang="tr-TR"/>
           </a:p>
@@ -1405,7 +1405,7 @@
           <a:p>
             <a:fld id="{DDE8600B-13D8-445D-818A-D9988767CA6C}" type="datetimeFigureOut">
               <a:rPr lang="tr-TR" smtClean="0"/>
-              <a:t>11.08.2018</a:t>
+              <a:t>12.08.2018</a:t>
             </a:fld>
             <a:endParaRPr lang="tr-TR"/>
           </a:p>
@@ -1817,7 +1817,7 @@
           <a:p>
             <a:fld id="{DDE8600B-13D8-445D-818A-D9988767CA6C}" type="datetimeFigureOut">
               <a:rPr lang="tr-TR" smtClean="0"/>
-              <a:t>11.08.2018</a:t>
+              <a:t>12.08.2018</a:t>
             </a:fld>
             <a:endParaRPr lang="tr-TR"/>
           </a:p>
@@ -1958,7 +1958,7 @@
           <a:p>
             <a:fld id="{DDE8600B-13D8-445D-818A-D9988767CA6C}" type="datetimeFigureOut">
               <a:rPr lang="tr-TR" smtClean="0"/>
-              <a:t>11.08.2018</a:t>
+              <a:t>12.08.2018</a:t>
             </a:fld>
             <a:endParaRPr lang="tr-TR"/>
           </a:p>
@@ -2071,7 +2071,7 @@
           <a:p>
             <a:fld id="{DDE8600B-13D8-445D-818A-D9988767CA6C}" type="datetimeFigureOut">
               <a:rPr lang="tr-TR" smtClean="0"/>
-              <a:t>11.08.2018</a:t>
+              <a:t>12.08.2018</a:t>
             </a:fld>
             <a:endParaRPr lang="tr-TR"/>
           </a:p>
@@ -2382,7 +2382,7 @@
           <a:p>
             <a:fld id="{DDE8600B-13D8-445D-818A-D9988767CA6C}" type="datetimeFigureOut">
               <a:rPr lang="tr-TR" smtClean="0"/>
-              <a:t>11.08.2018</a:t>
+              <a:t>12.08.2018</a:t>
             </a:fld>
             <a:endParaRPr lang="tr-TR"/>
           </a:p>
@@ -2670,7 +2670,7 @@
           <a:p>
             <a:fld id="{DDE8600B-13D8-445D-818A-D9988767CA6C}" type="datetimeFigureOut">
               <a:rPr lang="tr-TR" smtClean="0"/>
-              <a:t>11.08.2018</a:t>
+              <a:t>12.08.2018</a:t>
             </a:fld>
             <a:endParaRPr lang="tr-TR"/>
           </a:p>
@@ -2911,7 +2911,7 @@
           <a:p>
             <a:fld id="{DDE8600B-13D8-445D-818A-D9988767CA6C}" type="datetimeFigureOut">
               <a:rPr lang="tr-TR" smtClean="0"/>
-              <a:t>11.08.2018</a:t>
+              <a:t>12.08.2018</a:t>
             </a:fld>
             <a:endParaRPr lang="tr-TR"/>
           </a:p>
@@ -5030,7 +5030,7 @@
           <p:nvPr>
             <p:extLst>
               <p:ext uri="{D42A27DB-BD31-4B8C-83A1-F6EECF244321}">
-                <p14:modId xmlns:p14="http://schemas.microsoft.com/office/powerpoint/2010/main" val="3733036710"/>
+                <p14:modId xmlns:p14="http://schemas.microsoft.com/office/powerpoint/2010/main" val="24793810"/>
               </p:ext>
             </p:extLst>
           </p:nvPr>
@@ -5601,7 +5601,7 @@
                     <a:lstStyle/>
                     <a:p>
                       <a:r>
-                        <a:rPr lang="en-US" sz="2000" b="1" dirty="0">
+                        <a:rPr lang="en-US" sz="2000" b="1">
                           <a:solidFill>
                             <a:schemeClr val="tx1"/>
                           </a:solidFill>
@@ -5609,12 +5609,12 @@
                         <a:t>True  </a:t>
                       </a:r>
                       <a:r>
-                        <a:rPr lang="en-US" sz="2000" b="1" dirty="0">
+                        <a:rPr lang="en-US" sz="2000" b="1">
                           <a:solidFill>
                             <a:srgbClr val="FF0000"/>
                           </a:solidFill>
                         </a:rPr>
-                        <a:t>(0)</a:t>
+                        <a:t>(1)</a:t>
                       </a:r>
                       <a:endParaRPr lang="tr-TR" sz="2000" b="1" dirty="0">
                         <a:solidFill>

</xml_diff>